<commit_message>
additional analysis and presentation formating
</commit_message>
<xml_diff>
--- a/Presentation.pptx
+++ b/Presentation.pptx
@@ -19,7 +19,9 @@
     <p:sldId id="264" r:id="rId13"/>
     <p:sldId id="265" r:id="rId14"/>
     <p:sldId id="269" r:id="rId15"/>
-    <p:sldId id="266" r:id="rId16"/>
+    <p:sldId id="271" r:id="rId16"/>
+    <p:sldId id="272" r:id="rId17"/>
+    <p:sldId id="266" r:id="rId18"/>
   </p:sldIdLst>
   <p:sldSz cx="12192000" cy="6858000"/>
   <p:notesSz cx="6858000" cy="9144000"/>
@@ -4065,7 +4067,7 @@
           <p:cNvPr id="2" name="Title 1">
             <a:extLst>
               <a:ext uri="{FF2B5EF4-FFF2-40B4-BE49-F238E27FC236}">
-                <a16:creationId xmlns:a16="http://schemas.microsoft.com/office/drawing/2014/main" id="{55C38C5E-7F8E-BC4C-8261-454F84616B76}"/>
+                <a16:creationId xmlns:a16="http://schemas.microsoft.com/office/drawing/2014/main" id="{A8DAC611-DC01-724E-B9B5-89F8429664F1}"/>
               </a:ext>
             </a:extLst>
           </p:cNvPr>
@@ -4083,25 +4085,175 @@
           <a:p>
             <a:r>
               <a:rPr lang="en-US" dirty="0"/>
-              <a:t>Conclusions &amp; Next Steps</a:t>
-            </a:r>
-          </a:p>
-        </p:txBody>
-      </p:sp>
-      <p:sp>
-        <p:nvSpPr>
-          <p:cNvPr id="3" name="Content Placeholder 2">
-            <a:extLst>
-              <a:ext uri="{FF2B5EF4-FFF2-40B4-BE49-F238E27FC236}">
-                <a16:creationId xmlns:a16="http://schemas.microsoft.com/office/drawing/2014/main" id="{10C12C54-4062-DC4B-A95F-EFA4F3C25380}"/>
-              </a:ext>
-            </a:extLst>
-          </p:cNvPr>
-          <p:cNvSpPr>
-            <a:spLocks noGrp="1"/>
-          </p:cNvSpPr>
-          <p:nvPr>
-            <p:ph idx="1"/>
+              <a:t>Prev. Week Projection vs. Actual Points</a:t>
+            </a:r>
+          </a:p>
+        </p:txBody>
+      </p:sp>
+      <p:pic>
+        <p:nvPicPr>
+          <p:cNvPr id="4" name="Picture 3" descr="Chart, scatter chart&#10;&#10;Description automatically generated">
+            <a:extLst>
+              <a:ext uri="{FF2B5EF4-FFF2-40B4-BE49-F238E27FC236}">
+                <a16:creationId xmlns:a16="http://schemas.microsoft.com/office/drawing/2014/main" id="{6C275F83-56A9-4F49-B3FF-1DFE754BD3F8}"/>
+              </a:ext>
+            </a:extLst>
+          </p:cNvPr>
+          <p:cNvPicPr>
+            <a:picLocks noChangeAspect="1"/>
+          </p:cNvPicPr>
+          <p:nvPr/>
+        </p:nvPicPr>
+        <p:blipFill>
+          <a:blip r:embed="rId2"/>
+          <a:stretch>
+            <a:fillRect/>
+          </a:stretch>
+        </p:blipFill>
+        <p:spPr>
+          <a:xfrm>
+            <a:off x="2428875" y="1690688"/>
+            <a:ext cx="6711950" cy="4547548"/>
+          </a:xfrm>
+          <a:prstGeom prst="rect">
+            <a:avLst/>
+          </a:prstGeom>
+        </p:spPr>
+      </p:pic>
+    </p:spTree>
+    <p:extLst>
+      <p:ext uri="{BB962C8B-B14F-4D97-AF65-F5344CB8AC3E}">
+        <p14:creationId xmlns:p14="http://schemas.microsoft.com/office/powerpoint/2010/main" val="680267242"/>
+      </p:ext>
+    </p:extLst>
+  </p:cSld>
+  <p:clrMapOvr>
+    <a:masterClrMapping/>
+  </p:clrMapOvr>
+</p:sld>
+</file>
+
+<file path=ppt/slides/slide16.xml><?xml version="1.0" encoding="utf-8"?>
+<p:sld xmlns:a="http://schemas.openxmlformats.org/drawingml/2006/main" xmlns:r="http://schemas.openxmlformats.org/officeDocument/2006/relationships" xmlns:p="http://schemas.openxmlformats.org/presentationml/2006/main">
+  <p:cSld>
+    <p:spTree>
+      <p:nvGrpSpPr>
+        <p:cNvPr id="1" name=""/>
+        <p:cNvGrpSpPr/>
+        <p:nvPr/>
+      </p:nvGrpSpPr>
+      <p:grpSpPr>
+        <a:xfrm>
+          <a:off x="0" y="0"/>
+          <a:ext cx="0" cy="0"/>
+          <a:chOff x="0" y="0"/>
+          <a:chExt cx="0" cy="0"/>
+        </a:xfrm>
+      </p:grpSpPr>
+      <p:sp>
+        <p:nvSpPr>
+          <p:cNvPr id="2" name="Title 1">
+            <a:extLst>
+              <a:ext uri="{FF2B5EF4-FFF2-40B4-BE49-F238E27FC236}">
+                <a16:creationId xmlns:a16="http://schemas.microsoft.com/office/drawing/2014/main" id="{6D71D3FA-7058-E645-90F2-FDFD925821B1}"/>
+              </a:ext>
+            </a:extLst>
+          </p:cNvPr>
+          <p:cNvSpPr>
+            <a:spLocks noGrp="1"/>
+          </p:cNvSpPr>
+          <p:nvPr>
+            <p:ph type="title"/>
+          </p:nvPr>
+        </p:nvSpPr>
+        <p:spPr/>
+        <p:txBody>
+          <a:bodyPr>
+            <a:normAutofit/>
+          </a:bodyPr>
+          <a:lstStyle/>
+          <a:p>
+            <a:r>
+              <a:rPr lang="en-US" sz="4000" dirty="0"/>
+              <a:t>Average Points for Player vs. Standard Deviation </a:t>
+            </a:r>
+          </a:p>
+        </p:txBody>
+      </p:sp>
+      <p:pic>
+        <p:nvPicPr>
+          <p:cNvPr id="4" name="Picture 3" descr="Chart, scatter chart&#10;&#10;Description automatically generated">
+            <a:extLst>
+              <a:ext uri="{FF2B5EF4-FFF2-40B4-BE49-F238E27FC236}">
+                <a16:creationId xmlns:a16="http://schemas.microsoft.com/office/drawing/2014/main" id="{0180DFBD-AEAC-7549-97CB-6CF1CDA7F17C}"/>
+              </a:ext>
+            </a:extLst>
+          </p:cNvPr>
+          <p:cNvPicPr>
+            <a:picLocks noChangeAspect="1"/>
+          </p:cNvPicPr>
+          <p:nvPr/>
+        </p:nvPicPr>
+        <p:blipFill>
+          <a:blip r:embed="rId2"/>
+          <a:stretch>
+            <a:fillRect/>
+          </a:stretch>
+        </p:blipFill>
+        <p:spPr>
+          <a:xfrm>
+            <a:off x="2393950" y="1476375"/>
+            <a:ext cx="7404100" cy="5016500"/>
+          </a:xfrm>
+          <a:prstGeom prst="rect">
+            <a:avLst/>
+          </a:prstGeom>
+        </p:spPr>
+      </p:pic>
+    </p:spTree>
+    <p:extLst>
+      <p:ext uri="{BB962C8B-B14F-4D97-AF65-F5344CB8AC3E}">
+        <p14:creationId xmlns:p14="http://schemas.microsoft.com/office/powerpoint/2010/main" val="3114884193"/>
+      </p:ext>
+    </p:extLst>
+  </p:cSld>
+  <p:clrMapOvr>
+    <a:masterClrMapping/>
+  </p:clrMapOvr>
+</p:sld>
+</file>
+
+<file path=ppt/slides/slide17.xml><?xml version="1.0" encoding="utf-8"?>
+<p:sld xmlns:a="http://schemas.openxmlformats.org/drawingml/2006/main" xmlns:r="http://schemas.openxmlformats.org/officeDocument/2006/relationships" xmlns:p="http://schemas.openxmlformats.org/presentationml/2006/main">
+  <p:cSld>
+    <p:spTree>
+      <p:nvGrpSpPr>
+        <p:cNvPr id="1" name=""/>
+        <p:cNvGrpSpPr/>
+        <p:nvPr/>
+      </p:nvGrpSpPr>
+      <p:grpSpPr>
+        <a:xfrm>
+          <a:off x="0" y="0"/>
+          <a:ext cx="0" cy="0"/>
+          <a:chOff x="0" y="0"/>
+          <a:chExt cx="0" cy="0"/>
+        </a:xfrm>
+      </p:grpSpPr>
+      <p:sp>
+        <p:nvSpPr>
+          <p:cNvPr id="2" name="Title 1">
+            <a:extLst>
+              <a:ext uri="{FF2B5EF4-FFF2-40B4-BE49-F238E27FC236}">
+                <a16:creationId xmlns:a16="http://schemas.microsoft.com/office/drawing/2014/main" id="{55C38C5E-7F8E-BC4C-8261-454F84616B76}"/>
+              </a:ext>
+            </a:extLst>
+          </p:cNvPr>
+          <p:cNvSpPr>
+            <a:spLocks noGrp="1"/>
+          </p:cNvSpPr>
+          <p:nvPr>
+            <p:ph type="title"/>
           </p:nvPr>
         </p:nvSpPr>
         <p:spPr/>
@@ -4109,7 +4261,47 @@
           <a:bodyPr/>
           <a:lstStyle/>
           <a:p>
-            <a:endParaRPr lang="en-US"/>
+            <a:r>
+              <a:rPr lang="en-US" dirty="0"/>
+              <a:t>Conclusions &amp; Next Steps</a:t>
+            </a:r>
+          </a:p>
+        </p:txBody>
+      </p:sp>
+      <p:sp>
+        <p:nvSpPr>
+          <p:cNvPr id="3" name="Content Placeholder 2">
+            <a:extLst>
+              <a:ext uri="{FF2B5EF4-FFF2-40B4-BE49-F238E27FC236}">
+                <a16:creationId xmlns:a16="http://schemas.microsoft.com/office/drawing/2014/main" id="{10C12C54-4062-DC4B-A95F-EFA4F3C25380}"/>
+              </a:ext>
+            </a:extLst>
+          </p:cNvPr>
+          <p:cNvSpPr>
+            <a:spLocks noGrp="1"/>
+          </p:cNvSpPr>
+          <p:nvPr>
+            <p:ph idx="1"/>
+          </p:nvPr>
+        </p:nvSpPr>
+        <p:spPr/>
+        <p:txBody>
+          <a:bodyPr/>
+          <a:lstStyle/>
+          <a:p>
+            <a:r>
+              <a:rPr lang="en-US" dirty="0"/>
+              <a:t>Include player standard deviation as constraint in LP Solver function</a:t>
+            </a:r>
+          </a:p>
+          <a:p>
+            <a:r>
+              <a:rPr lang="en-US" dirty="0"/>
+              <a:t>Incorporate actual player statistic and create model to run more accurate position than running average</a:t>
+            </a:r>
+          </a:p>
+          <a:p>
+            <a:endParaRPr lang="en-US" dirty="0"/>
           </a:p>
         </p:txBody>
       </p:sp>

</xml_diff>